<commit_message>
Added Ryan Keller and Andy Ko to opening slides.
</commit_message>
<xml_diff>
--- a/lectures/lecture-1.1.pptx
+++ b/lectures/lecture-1.1.pptx
@@ -3500,7 +3500,7 @@
             <a:fld id="{5586B75A-687E-405C-8A0B-8D00578BA2C3}" type="datetimeFigureOut">
               <a:rPr lang="en-US" dirty="0"/>
               <a:pPr/>
-              <a:t>2/25/18</a:t>
+              <a:t>3/25/18</a:t>
             </a:fld>
             <a:endParaRPr lang="en-US" dirty="0"/>
           </a:p>
@@ -3666,7 +3666,7 @@
           <a:p>
             <a:fld id="{5F4E5243-F52A-4D37-9694-EB26C6C31910}" type="datetimeFigureOut">
               <a:rPr lang="en-US" dirty="0"/>
-              <a:t>2/25/18</a:t>
+              <a:t>3/25/18</a:t>
             </a:fld>
             <a:endParaRPr lang="en-US" dirty="0"/>
           </a:p>
@@ -3841,7 +3841,7 @@
           <a:p>
             <a:fld id="{3A77B6E1-634A-48DC-9E8B-D894023267EF}" type="datetimeFigureOut">
               <a:rPr lang="en-US" dirty="0"/>
-              <a:t>2/25/18</a:t>
+              <a:t>3/25/18</a:t>
             </a:fld>
             <a:endParaRPr lang="en-US" dirty="0"/>
           </a:p>
@@ -4006,7 +4006,7 @@
           <a:p>
             <a:fld id="{7B2D3E9E-A95C-48F2-B4BF-A71542E0BE9A}" type="datetimeFigureOut">
               <a:rPr lang="en-US" dirty="0"/>
-              <a:t>2/25/18</a:t>
+              <a:t>3/25/18</a:t>
             </a:fld>
             <a:endParaRPr lang="en-US" dirty="0"/>
           </a:p>
@@ -4266,7 +4266,7 @@
             <a:fld id="{5586B75A-687E-405C-8A0B-8D00578BA2C3}" type="datetimeFigureOut">
               <a:rPr lang="en-US" dirty="0"/>
               <a:pPr/>
-              <a:t>2/25/18</a:t>
+              <a:t>3/25/18</a:t>
             </a:fld>
             <a:endParaRPr lang="en-US" dirty="0"/>
           </a:p>
@@ -4550,7 +4550,7 @@
           <a:p>
             <a:fld id="{F12952B5-7A2F-4CC8-B7CE-9234E21C2837}" type="datetimeFigureOut">
               <a:rPr lang="en-US" dirty="0"/>
-              <a:t>2/25/18</a:t>
+              <a:t>3/25/18</a:t>
             </a:fld>
             <a:endParaRPr lang="en-US" dirty="0"/>
           </a:p>
@@ -4974,7 +4974,7 @@
           <a:p>
             <a:fld id="{CE1DA07A-9201-4B4B-BAF2-015AFA30F520}" type="datetimeFigureOut">
               <a:rPr lang="en-US" dirty="0"/>
-              <a:t>2/25/18</a:t>
+              <a:t>3/25/18</a:t>
             </a:fld>
             <a:endParaRPr lang="en-US" dirty="0"/>
           </a:p>
@@ -5087,7 +5087,7 @@
           <a:p>
             <a:fld id="{73D7E00A-486F-4252-8B1D-E32645521F49}" type="datetimeFigureOut">
               <a:rPr lang="en-US" dirty="0"/>
-              <a:t>2/25/18</a:t>
+              <a:t>3/25/18</a:t>
             </a:fld>
             <a:endParaRPr lang="en-US" dirty="0"/>
           </a:p>
@@ -5177,7 +5177,7 @@
           <a:p>
             <a:fld id="{8DDF5F92-E675-4B36-9A60-69A962A68675}" type="datetimeFigureOut">
               <a:rPr lang="en-US" dirty="0"/>
-              <a:t>2/25/18</a:t>
+              <a:t>3/25/18</a:t>
             </a:fld>
             <a:endParaRPr lang="en-US" dirty="0"/>
           </a:p>
@@ -5528,7 +5528,7 @@
           <a:p>
             <a:fld id="{AF6E2C9B-5FA2-460D-9BE7-B0812FC2A6FF}" type="datetimeFigureOut">
               <a:rPr lang="en-US" dirty="0"/>
-              <a:t>2/25/18</a:t>
+              <a:t>3/25/18</a:t>
             </a:fld>
             <a:endParaRPr lang="en-US" dirty="0"/>
           </a:p>
@@ -5828,7 +5828,7 @@
             <a:fld id="{5586B75A-687E-405C-8A0B-8D00578BA2C3}" type="datetimeFigureOut">
               <a:rPr lang="en-US" dirty="0"/>
               <a:pPr/>
-              <a:t>2/25/18</a:t>
+              <a:t>3/25/18</a:t>
             </a:fld>
             <a:endParaRPr lang="en-US" dirty="0"/>
           </a:p>
@@ -6038,7 +6038,7 @@
             <a:fld id="{5586B75A-687E-405C-8A0B-8D00578BA2C3}" type="datetimeFigureOut">
               <a:rPr lang="en-US" dirty="0"/>
               <a:pPr/>
-              <a:t>2/25/18</a:t>
+              <a:t>3/25/18</a:t>
             </a:fld>
             <a:endParaRPr lang="en-US" dirty="0"/>
           </a:p>
@@ -6506,7 +6506,7 @@
         <p:spPr>
           <a:xfrm>
             <a:off x="667512" y="4206875"/>
-            <a:ext cx="9228201" cy="1799069"/>
+            <a:ext cx="11107928" cy="1799069"/>
           </a:xfrm>
         </p:spPr>
         <p:txBody>
@@ -6520,10 +6520,38 @@
               <a:t>Instructor: Dr. Andrew Begel, Microsoft Research </a:t>
             </a:r>
             <a:r>
+              <a:rPr lang="en-US" i="1" dirty="0"/>
+              <a:t>abegel@uw.edu</a:t>
+            </a:r>
+          </a:p>
+          <a:p>
+            <a:r>
+              <a:rPr lang="en-US" dirty="0"/>
+              <a:t>TA: Ryan Keller, UW </a:t>
+            </a:r>
+            <a:r>
               <a:rPr lang="en-US" i="1" dirty="0" err="1"/>
-              <a:t>abegel@uw.edu</a:t>
-            </a:r>
-            <a:endParaRPr lang="en-US" dirty="0"/>
+              <a:t>rykeller@uw.edu</a:t>
+            </a:r>
+            <a:endParaRPr lang="en-US" i="1" dirty="0"/>
+          </a:p>
+          <a:p>
+            <a:r>
+              <a:rPr lang="en-US" dirty="0"/>
+              <a:t>LA: Prof. Andy </a:t>
+            </a:r>
+            <a:r>
+              <a:rPr lang="en-US" dirty="0" err="1"/>
+              <a:t>Ko</a:t>
+            </a:r>
+            <a:r>
+              <a:rPr lang="en-US" dirty="0"/>
+              <a:t>, UW </a:t>
+            </a:r>
+            <a:r>
+              <a:rPr lang="en-US" i="1" dirty="0"/>
+              <a:t>ajko@uw.edu</a:t>
+            </a:r>
           </a:p>
         </p:txBody>
       </p:sp>
@@ -6629,7 +6657,7 @@
             <a:pPr lvl="1"/>
             <a:r>
               <a:rPr lang="en-US" dirty="0"/>
-              <a:t>Let me know! I want your feedback to improve the course.</a:t>
+              <a:t>Let us know! We want your feedback to improve the course.</a:t>
             </a:r>
           </a:p>
           <a:p>
@@ -8616,10 +8644,9 @@
               <a:buAutoNum type="arabicPeriod"/>
             </a:pPr>
             <a:r>
-              <a:rPr lang="en-US"/>
-              <a:t>Effort Estimation</a:t>
-            </a:r>
-            <a:endParaRPr lang="en-US" dirty="0"/>
+              <a:rPr lang="en-US" dirty="0"/>
+              <a:t>SMART Commitments</a:t>
+            </a:r>
           </a:p>
           <a:p>
             <a:pPr marL="457200" indent="-457200">
@@ -8894,21 +8921,6 @@
 </file>
 
 <file path=customXml/item1.xml><?xml version="1.0" encoding="utf-8"?>
-<?mso-contentType ?>
-<FormTemplates xmlns="http://schemas.microsoft.com/sharepoint/v3/contenttype/forms">
-  <Display>DocumentLibraryForm</Display>
-  <Edit>DocumentLibraryForm</Edit>
-  <New>DocumentLibraryForm</New>
-</FormTemplates>
-</file>
-
-<file path=customXml/item2.xml><?xml version="1.0" encoding="utf-8"?>
-<p:properties xmlns:p="http://schemas.microsoft.com/office/2006/metadata/properties" xmlns:xsi="http://www.w3.org/2001/XMLSchema-instance" xmlns:pc="http://schemas.microsoft.com/office/infopath/2007/PartnerControls">
-  <documentManagement/>
-</p:properties>
-</file>
-
-<file path=customXml/item3.xml><?xml version="1.0" encoding="utf-8"?>
 <ct:contentTypeSchema xmlns:ct="http://schemas.microsoft.com/office/2006/metadata/contentType" xmlns:ma="http://schemas.microsoft.com/office/2006/metadata/properties/metaAttributes" ct:_="" ma:_="" ma:contentTypeName="Document" ma:contentTypeID="0x010100A9FA91C1AD8BBB45A40574BDB21677D4" ma:contentTypeVersion="1" ma:contentTypeDescription="Create a new document." ma:contentTypeScope="" ma:versionID="46753e6b9e20f385b6d3ef85273ddd95">
   <xsd:schema xmlns:xsd="http://www.w3.org/2001/XMLSchema" xmlns:xs="http://www.w3.org/2001/XMLSchema" xmlns:p="http://schemas.microsoft.com/office/2006/metadata/properties" xmlns:ns3="4e929025-d872-4c3a-a0bb-7437d4bf978e" targetNamespace="http://schemas.microsoft.com/office/2006/metadata/properties" ma:root="true" ma:fieldsID="f351dd6823753148206ee3076f8f9e69" ns3:_="">
     <xsd:import namespace="4e929025-d872-4c3a-a0bb-7437d4bf978e"/>
@@ -9048,24 +9060,22 @@
 </ct:contentTypeSchema>
 </file>
 
-<file path=customXml/itemProps1.xml><?xml version="1.0" encoding="utf-8"?>
-<ds:datastoreItem xmlns:ds="http://schemas.openxmlformats.org/officeDocument/2006/customXml" ds:itemID="{4B1CC6D9-BE37-4C89-B69E-535CC0E545F0}">
-  <ds:schemaRefs>
-    <ds:schemaRef ds:uri="http://schemas.microsoft.com/sharepoint/v3/contenttype/forms"/>
-  </ds:schemaRefs>
-</ds:datastoreItem>
+<file path=customXml/item2.xml><?xml version="1.0" encoding="utf-8"?>
+<p:properties xmlns:p="http://schemas.microsoft.com/office/2006/metadata/properties" xmlns:xsi="http://www.w3.org/2001/XMLSchema-instance" xmlns:pc="http://schemas.microsoft.com/office/infopath/2007/PartnerControls">
+  <documentManagement/>
+</p:properties>
 </file>
 
-<file path=customXml/itemProps2.xml><?xml version="1.0" encoding="utf-8"?>
-<ds:datastoreItem xmlns:ds="http://schemas.openxmlformats.org/officeDocument/2006/customXml" ds:itemID="{F052396D-5413-47B9-BB10-18C966CD3EC9}">
-  <ds:schemaRefs>
-    <ds:schemaRef ds:uri="http://schemas.microsoft.com/office/2006/metadata/properties"/>
-    <ds:schemaRef ds:uri="http://schemas.microsoft.com/office/infopath/2007/PartnerControls"/>
-  </ds:schemaRefs>
-</ds:datastoreItem>
+<file path=customXml/item3.xml><?xml version="1.0" encoding="utf-8"?>
+<?mso-contentType ?>
+<FormTemplates xmlns="http://schemas.microsoft.com/sharepoint/v3/contenttype/forms">
+  <Display>DocumentLibraryForm</Display>
+  <Edit>DocumentLibraryForm</Edit>
+  <New>DocumentLibraryForm</New>
+</FormTemplates>
 </file>
 
-<file path=customXml/itemProps3.xml><?xml version="1.0" encoding="utf-8"?>
+<file path=customXml/itemProps1.xml><?xml version="1.0" encoding="utf-8"?>
 <ds:datastoreItem xmlns:ds="http://schemas.openxmlformats.org/officeDocument/2006/customXml" ds:itemID="{04F88AEE-BC9C-40D9-B0A6-F33E421E0E08}">
   <ds:schemaRefs>
     <ds:schemaRef ds:uri="http://schemas.microsoft.com/office/2006/metadata/contentType"/>
@@ -9081,4 +9091,21 @@
     <ds:schemaRef ds:uri="http://schemas.microsoft.com/internal/obd"/>
   </ds:schemaRefs>
 </ds:datastoreItem>
+</file>
+
+<file path=customXml/itemProps2.xml><?xml version="1.0" encoding="utf-8"?>
+<ds:datastoreItem xmlns:ds="http://schemas.openxmlformats.org/officeDocument/2006/customXml" ds:itemID="{F052396D-5413-47B9-BB10-18C966CD3EC9}">
+  <ds:schemaRefs>
+    <ds:schemaRef ds:uri="http://schemas.microsoft.com/office/2006/metadata/properties"/>
+    <ds:schemaRef ds:uri="http://schemas.microsoft.com/office/infopath/2007/PartnerControls"/>
+  </ds:schemaRefs>
+</ds:datastoreItem>
+</file>
+
+<file path=customXml/itemProps3.xml><?xml version="1.0" encoding="utf-8"?>
+<ds:datastoreItem xmlns:ds="http://schemas.openxmlformats.org/officeDocument/2006/customXml" ds:itemID="{4B1CC6D9-BE37-4C89-B69E-535CC0E545F0}">
+  <ds:schemaRefs>
+    <ds:schemaRef ds:uri="http://schemas.microsoft.com/sharepoint/v3/contenttype/forms"/>
+  </ds:schemaRefs>
+</ds:datastoreItem>
 </file>
</xml_diff>